<commit_message>
add back in adaptive compare to new data run for consistency
</commit_message>
<xml_diff>
--- a/Data/Paper/Mastor_detecter.pptx
+++ b/Data/Paper/Mastor_detecter.pptx
@@ -9,6 +9,9 @@
     <p:sldId id="257" r:id="rId3"/>
     <p:sldId id="258" r:id="rId4"/>
     <p:sldId id="259" r:id="rId5"/>
+    <p:sldId id="260" r:id="rId6"/>
+    <p:sldId id="261" r:id="rId7"/>
+    <p:sldId id="262" r:id="rId8"/>
   </p:sldIdLst>
   <p:sldSz cx="12192000" cy="6858000"/>
   <p:notesSz cx="6858000" cy="9144000"/>
@@ -262,7 +265,7 @@
           <a:p>
             <a:fld id="{B9493756-01E3-4520-97E2-D5C39DC38B1B}" type="datetimeFigureOut">
               <a:rPr lang="en-US" smtClean="0"/>
-              <a:t>04/04/2019</a:t>
+              <a:t>04/05/2019</a:t>
             </a:fld>
             <a:endParaRPr lang="en-US"/>
           </a:p>
@@ -460,7 +463,7 @@
           <a:p>
             <a:fld id="{B9493756-01E3-4520-97E2-D5C39DC38B1B}" type="datetimeFigureOut">
               <a:rPr lang="en-US" smtClean="0"/>
-              <a:t>04/04/2019</a:t>
+              <a:t>04/05/2019</a:t>
             </a:fld>
             <a:endParaRPr lang="en-US"/>
           </a:p>
@@ -668,7 +671,7 @@
           <a:p>
             <a:fld id="{B9493756-01E3-4520-97E2-D5C39DC38B1B}" type="datetimeFigureOut">
               <a:rPr lang="en-US" smtClean="0"/>
-              <a:t>04/04/2019</a:t>
+              <a:t>04/05/2019</a:t>
             </a:fld>
             <a:endParaRPr lang="en-US"/>
           </a:p>
@@ -866,7 +869,7 @@
           <a:p>
             <a:fld id="{B9493756-01E3-4520-97E2-D5C39DC38B1B}" type="datetimeFigureOut">
               <a:rPr lang="en-US" smtClean="0"/>
-              <a:t>04/04/2019</a:t>
+              <a:t>04/05/2019</a:t>
             </a:fld>
             <a:endParaRPr lang="en-US"/>
           </a:p>
@@ -1141,7 +1144,7 @@
           <a:p>
             <a:fld id="{B9493756-01E3-4520-97E2-D5C39DC38B1B}" type="datetimeFigureOut">
               <a:rPr lang="en-US" smtClean="0"/>
-              <a:t>04/04/2019</a:t>
+              <a:t>04/05/2019</a:t>
             </a:fld>
             <a:endParaRPr lang="en-US"/>
           </a:p>
@@ -1406,7 +1409,7 @@
           <a:p>
             <a:fld id="{B9493756-01E3-4520-97E2-D5C39DC38B1B}" type="datetimeFigureOut">
               <a:rPr lang="en-US" smtClean="0"/>
-              <a:t>04/04/2019</a:t>
+              <a:t>04/05/2019</a:t>
             </a:fld>
             <a:endParaRPr lang="en-US"/>
           </a:p>
@@ -1818,7 +1821,7 @@
           <a:p>
             <a:fld id="{B9493756-01E3-4520-97E2-D5C39DC38B1B}" type="datetimeFigureOut">
               <a:rPr lang="en-US" smtClean="0"/>
-              <a:t>04/04/2019</a:t>
+              <a:t>04/05/2019</a:t>
             </a:fld>
             <a:endParaRPr lang="en-US"/>
           </a:p>
@@ -1959,7 +1962,7 @@
           <a:p>
             <a:fld id="{B9493756-01E3-4520-97E2-D5C39DC38B1B}" type="datetimeFigureOut">
               <a:rPr lang="en-US" smtClean="0"/>
-              <a:t>04/04/2019</a:t>
+              <a:t>04/05/2019</a:t>
             </a:fld>
             <a:endParaRPr lang="en-US"/>
           </a:p>
@@ -2072,7 +2075,7 @@
           <a:p>
             <a:fld id="{B9493756-01E3-4520-97E2-D5C39DC38B1B}" type="datetimeFigureOut">
               <a:rPr lang="en-US" smtClean="0"/>
-              <a:t>04/04/2019</a:t>
+              <a:t>04/05/2019</a:t>
             </a:fld>
             <a:endParaRPr lang="en-US"/>
           </a:p>
@@ -2383,7 +2386,7 @@
           <a:p>
             <a:fld id="{B9493756-01E3-4520-97E2-D5C39DC38B1B}" type="datetimeFigureOut">
               <a:rPr lang="en-US" smtClean="0"/>
-              <a:t>04/04/2019</a:t>
+              <a:t>04/05/2019</a:t>
             </a:fld>
             <a:endParaRPr lang="en-US"/>
           </a:p>
@@ -2671,7 +2674,7 @@
           <a:p>
             <a:fld id="{B9493756-01E3-4520-97E2-D5C39DC38B1B}" type="datetimeFigureOut">
               <a:rPr lang="en-US" smtClean="0"/>
-              <a:t>04/04/2019</a:t>
+              <a:t>04/05/2019</a:t>
             </a:fld>
             <a:endParaRPr lang="en-US"/>
           </a:p>
@@ -2912,7 +2915,7 @@
           <a:p>
             <a:fld id="{B9493756-01E3-4520-97E2-D5C39DC38B1B}" type="datetimeFigureOut">
               <a:rPr lang="en-US" smtClean="0"/>
-              <a:t>04/04/2019</a:t>
+              <a:t>04/05/2019</a:t>
             </a:fld>
             <a:endParaRPr lang="en-US"/>
           </a:p>
@@ -3512,12 +3515,35 @@
         </p:nvSpPr>
         <p:spPr/>
         <p:txBody>
-          <a:bodyPr/>
+          <a:bodyPr>
+            <a:normAutofit fontScale="62500" lnSpcReduction="20000"/>
+          </a:bodyPr>
           <a:lstStyle/>
           <a:p>
             <a:r>
               <a:rPr lang="en-US" dirty="0"/>
-              <a:t>Data processing- decimation, whitening, combination</a:t>
+              <a:t>Data processing </a:t>
+            </a:r>
+          </a:p>
+          <a:p>
+            <a:pPr lvl="1"/>
+            <a:r>
+              <a:rPr lang="en-US" dirty="0"/>
+              <a:t>Decimation </a:t>
+            </a:r>
+          </a:p>
+          <a:p>
+            <a:pPr lvl="1"/>
+            <a:r>
+              <a:rPr lang="en-US" dirty="0"/>
+              <a:t>Whitening</a:t>
+            </a:r>
+          </a:p>
+          <a:p>
+            <a:pPr lvl="1"/>
+            <a:r>
+              <a:rPr lang="en-US" dirty="0"/>
+              <a:t>Combination</a:t>
             </a:r>
           </a:p>
           <a:p>
@@ -3530,14 +3556,14 @@
             <a:pPr lvl="1"/>
             <a:r>
               <a:rPr lang="en-US" dirty="0"/>
-              <a:t>Obtaining boxes</a:t>
+              <a:t>Obtaining putative detections</a:t>
             </a:r>
           </a:p>
           <a:p>
             <a:pPr lvl="2"/>
             <a:r>
               <a:rPr lang="en-US" dirty="0"/>
-              <a:t>Raven Band Limited Energy Detectors </a:t>
+              <a:t>Raven Band Limited Energy Detectors (BLED)</a:t>
             </a:r>
           </a:p>
           <a:p>
@@ -3560,6 +3586,64 @@
               <a:rPr lang="en-US" dirty="0"/>
               <a:t>Compare to ground truth to assess accuracy of Raven detectors and algorithm</a:t>
             </a:r>
+          </a:p>
+          <a:p>
+            <a:pPr lvl="2"/>
+            <a:r>
+              <a:rPr lang="en-US" dirty="0"/>
+              <a:t>Training data</a:t>
+            </a:r>
+          </a:p>
+          <a:p>
+            <a:r>
+              <a:rPr lang="en-US" dirty="0"/>
+              <a:t>Model</a:t>
+            </a:r>
+          </a:p>
+          <a:p>
+            <a:pPr lvl="1"/>
+            <a:r>
+              <a:rPr lang="en-US" dirty="0"/>
+              <a:t>Feature extraction</a:t>
+            </a:r>
+          </a:p>
+          <a:p>
+            <a:pPr lvl="1"/>
+            <a:r>
+              <a:rPr lang="en-US" dirty="0"/>
+              <a:t>Cross-validation</a:t>
+            </a:r>
+          </a:p>
+          <a:p>
+            <a:r>
+              <a:rPr lang="en-US" dirty="0"/>
+              <a:t>Outputs</a:t>
+            </a:r>
+          </a:p>
+          <a:p>
+            <a:pPr lvl="1"/>
+            <a:r>
+              <a:rPr lang="en-US" dirty="0"/>
+              <a:t>Metrics</a:t>
+            </a:r>
+          </a:p>
+          <a:p>
+            <a:pPr lvl="1"/>
+            <a:r>
+              <a:rPr lang="en-US" dirty="0"/>
+              <a:t>Data</a:t>
+            </a:r>
+          </a:p>
+          <a:p>
+            <a:pPr lvl="1"/>
+            <a:r>
+              <a:rPr lang="en-US" dirty="0"/>
+              <a:t>Assumptions</a:t>
+            </a:r>
+          </a:p>
+          <a:p>
+            <a:pPr lvl="2"/>
+            <a:endParaRPr lang="en-US" dirty="0"/>
           </a:p>
           <a:p>
             <a:pPr lvl="2"/>
@@ -3617,6 +3701,9 @@
           <a:prstGeom prst="ellipse">
             <a:avLst/>
           </a:prstGeom>
+          <a:solidFill>
+            <a:schemeClr val="accent2"/>
+          </a:solidFill>
         </p:spPr>
         <p:style>
           <a:lnRef idx="2">
@@ -3849,6 +3936,9 @@
           <a:prstGeom prst="ellipse">
             <a:avLst/>
           </a:prstGeom>
+          <a:solidFill>
+            <a:schemeClr val="accent2"/>
+          </a:solidFill>
         </p:spPr>
         <p:style>
           <a:lnRef idx="2">
@@ -4075,6 +4165,9 @@
           <a:prstGeom prst="ellipse">
             <a:avLst/>
           </a:prstGeom>
+          <a:solidFill>
+            <a:srgbClr val="7030A0"/>
+          </a:solidFill>
         </p:spPr>
         <p:style>
           <a:lnRef idx="2">
@@ -4167,6 +4260,9 @@
           <a:prstGeom prst="ellipse">
             <a:avLst/>
           </a:prstGeom>
+          <a:solidFill>
+            <a:srgbClr val="7030A0"/>
+          </a:solidFill>
         </p:spPr>
         <p:style>
           <a:lnRef idx="2">
@@ -4554,7 +4650,7 @@
         </p:nvSpPr>
         <p:spPr>
           <a:xfrm>
-            <a:off x="1349153" y="4075091"/>
+            <a:off x="1551559" y="3736759"/>
             <a:ext cx="2472297" cy="400110"/>
           </a:xfrm>
           <a:prstGeom prst="rect">
@@ -5073,6 +5169,11 @@
           <a:prstGeom prst="ellipse">
             <a:avLst/>
           </a:prstGeom>
+          <a:solidFill>
+            <a:schemeClr val="accent4">
+              <a:lumMod val="75000"/>
+            </a:schemeClr>
+          </a:solidFill>
         </p:spPr>
         <p:style>
           <a:lnRef idx="2">
@@ -5249,6 +5350,11 @@
           <a:prstGeom prst="roundRect">
             <a:avLst/>
           </a:prstGeom>
+          <a:solidFill>
+            <a:schemeClr val="accent4">
+              <a:lumMod val="75000"/>
+            </a:schemeClr>
+          </a:solidFill>
         </p:spPr>
         <p:style>
           <a:lnRef idx="2">
@@ -5298,6 +5404,11 @@
           <a:prstGeom prst="roundRect">
             <a:avLst/>
           </a:prstGeom>
+          <a:solidFill>
+            <a:schemeClr val="accent4">
+              <a:lumMod val="75000"/>
+            </a:schemeClr>
+          </a:solidFill>
         </p:spPr>
         <p:style>
           <a:lnRef idx="2">
@@ -5555,7 +5666,7 @@
             <a:r>
               <a:rPr lang="en-US" sz="1200" b="1" dirty="0">
                 <a:solidFill>
-                  <a:schemeClr val="accent1"/>
+                  <a:schemeClr val="accent6"/>
                 </a:solidFill>
               </a:rPr>
               <a:t>If performance  is satisfactory</a:t>
@@ -5594,7 +5705,7 @@
             <a:r>
               <a:rPr lang="en-US" sz="1200" b="1" dirty="0">
                 <a:solidFill>
-                  <a:schemeClr val="accent1"/>
+                  <a:schemeClr val="accent6"/>
                 </a:solidFill>
               </a:rPr>
               <a:t>If data has GT</a:t>
@@ -6374,6 +6485,11 @@
           <a:prstGeom prst="roundRect">
             <a:avLst/>
           </a:prstGeom>
+          <a:solidFill>
+            <a:schemeClr val="accent4">
+              <a:lumMod val="75000"/>
+            </a:schemeClr>
+          </a:solidFill>
         </p:spPr>
         <p:style>
           <a:lnRef idx="2">
@@ -6517,7 +6633,7 @@
             <a:r>
               <a:rPr lang="en-US" sz="1200" b="1" dirty="0">
                 <a:solidFill>
-                  <a:schemeClr val="accent1"/>
+                  <a:schemeClr val="accent6"/>
                 </a:solidFill>
               </a:rPr>
               <a:t>If performance is satisfactory</a:t>
@@ -6622,6 +6738,9 @@
           <a:prstGeom prst="ellipse">
             <a:avLst/>
           </a:prstGeom>
+          <a:solidFill>
+            <a:srgbClr val="7030A0"/>
+          </a:solidFill>
         </p:spPr>
         <p:style>
           <a:lnRef idx="2">
@@ -6671,6 +6790,9 @@
           <a:prstGeom prst="ellipse">
             <a:avLst/>
           </a:prstGeom>
+          <a:solidFill>
+            <a:schemeClr val="accent2"/>
+          </a:solidFill>
         </p:spPr>
         <p:style>
           <a:lnRef idx="2">
@@ -6897,7 +7019,7 @@
             <a:r>
               <a:rPr lang="en-US" sz="1200" b="1" dirty="0">
                 <a:solidFill>
-                  <a:schemeClr val="accent1"/>
+                  <a:schemeClr val="accent6"/>
                 </a:solidFill>
               </a:rPr>
               <a:t>If performance is satisfactory</a:t>
@@ -6936,7 +7058,7 @@
             <a:r>
               <a:rPr lang="en-US" sz="1200" b="1" dirty="0">
                 <a:solidFill>
-                  <a:schemeClr val="accent1"/>
+                  <a:schemeClr val="accent6"/>
                 </a:solidFill>
               </a:rPr>
               <a:t>If data is unseen</a:t>
@@ -7032,7 +7154,7 @@
           <a:p>
             <a:r>
               <a:rPr lang="en-US" dirty="0"/>
-              <a:t>Data processing</a:t>
+              <a:t>Data processing: Decimation </a:t>
             </a:r>
           </a:p>
         </p:txBody>
@@ -7055,26 +7177,62 @@
         </p:nvSpPr>
         <p:spPr/>
         <p:txBody>
-          <a:bodyPr/>
+          <a:bodyPr>
+            <a:normAutofit fontScale="92500" lnSpcReduction="10000"/>
+          </a:bodyPr>
           <a:lstStyle/>
           <a:p>
             <a:r>
               <a:rPr lang="en-US" dirty="0"/>
-              <a:t>Data is decimated and whitened according to user preference</a:t>
+              <a:t>The first transformation performed on data is decimation. </a:t>
             </a:r>
           </a:p>
           <a:p>
             <a:pPr lvl="1"/>
             <a:r>
               <a:rPr lang="en-US" dirty="0"/>
-              <a:t>Decimation factor: 16 for RW</a:t>
+              <a:t>Decimation is key for optimizing run time of script and minimizing disk space required.  </a:t>
+            </a:r>
+          </a:p>
+          <a:p>
+            <a:r>
+              <a:rPr lang="en-US" dirty="0"/>
+              <a:t>Data is decimated according to user preference</a:t>
             </a:r>
           </a:p>
           <a:p>
             <a:pPr lvl="1"/>
             <a:r>
               <a:rPr lang="en-US" dirty="0"/>
-              <a:t>Whitening: happens outside of script, but need to give script parameters to path correctly (LMS and FO). </a:t>
+              <a:t>Our included data comes from AURALS (16384Hz sample rate) </a:t>
+            </a:r>
+          </a:p>
+          <a:p>
+            <a:pPr lvl="1"/>
+            <a:r>
+              <a:rPr lang="en-US" dirty="0"/>
+              <a:t>Decimation factor can be set by user depending on signal of interest and instrument specification. We chose a decimation factor of 16 to obtain a signal of 1024Hz sample rate. </a:t>
+            </a:r>
+          </a:p>
+          <a:p>
+            <a:pPr lvl="1"/>
+            <a:r>
+              <a:rPr lang="en-US" dirty="0"/>
+              <a:t>Decimation is performed iteratively based on the prime factors of your decimation factor. A decimation factor of 16 will be decimated x2, 4 times. </a:t>
+            </a:r>
+          </a:p>
+          <a:p>
+            <a:pPr lvl="2"/>
+            <a:r>
+              <a:rPr lang="en-US" dirty="0"/>
+              <a:t>Make sure you choose a divisor that will result in an integer sample rate. Divisors with more prime factors with decimate more quickly.  </a:t>
+            </a:r>
+          </a:p>
+          <a:p>
+            <a:pPr lvl="1"/>
+            <a:r>
+              <a:rPr lang="en-US" dirty="0"/>
+              <a:t>Decimated data will be written to your drive as a subfolder of your provided data. </a:t>
             </a:r>
           </a:p>
         </p:txBody>
@@ -7083,6 +7241,315 @@
     <p:extLst>
       <p:ext uri="{BB962C8B-B14F-4D97-AF65-F5344CB8AC3E}">
         <p14:creationId xmlns:p14="http://schemas.microsoft.com/office/powerpoint/2010/main" val="1372386003"/>
+      </p:ext>
+    </p:extLst>
+  </p:cSld>
+  <p:clrMapOvr>
+    <a:masterClrMapping/>
+  </p:clrMapOvr>
+</p:sld>
+</file>
+
+<file path=ppt/slides/slide5.xml><?xml version="1.0" encoding="utf-8"?>
+<p:sld xmlns:a="http://schemas.openxmlformats.org/drawingml/2006/main" xmlns:r="http://schemas.openxmlformats.org/officeDocument/2006/relationships" xmlns:p="http://schemas.openxmlformats.org/presentationml/2006/main">
+  <p:cSld>
+    <p:spTree>
+      <p:nvGrpSpPr>
+        <p:cNvPr id="1" name=""/>
+        <p:cNvGrpSpPr/>
+        <p:nvPr/>
+      </p:nvGrpSpPr>
+      <p:grpSpPr>
+        <a:xfrm>
+          <a:off x="0" y="0"/>
+          <a:ext cx="0" cy="0"/>
+          <a:chOff x="0" y="0"/>
+          <a:chExt cx="0" cy="0"/>
+        </a:xfrm>
+      </p:grpSpPr>
+      <p:sp>
+        <p:nvSpPr>
+          <p:cNvPr id="2" name="Title 1">
+            <a:extLst>
+              <a:ext uri="{FF2B5EF4-FFF2-40B4-BE49-F238E27FC236}">
+                <a16:creationId xmlns:a16="http://schemas.microsoft.com/office/drawing/2014/main" id="{1FBA2D1F-01ED-49FF-A60D-818BDDC64506}"/>
+              </a:ext>
+            </a:extLst>
+          </p:cNvPr>
+          <p:cNvSpPr>
+            <a:spLocks noGrp="1"/>
+          </p:cNvSpPr>
+          <p:nvPr>
+            <p:ph type="title"/>
+          </p:nvPr>
+        </p:nvSpPr>
+        <p:spPr/>
+        <p:txBody>
+          <a:bodyPr/>
+          <a:lstStyle/>
+          <a:p>
+            <a:r>
+              <a:rPr lang="en-US" dirty="0"/>
+              <a:t>Data processing: Whitening</a:t>
+            </a:r>
+          </a:p>
+        </p:txBody>
+      </p:sp>
+      <p:sp>
+        <p:nvSpPr>
+          <p:cNvPr id="3" name="Content Placeholder 2">
+            <a:extLst>
+              <a:ext uri="{FF2B5EF4-FFF2-40B4-BE49-F238E27FC236}">
+                <a16:creationId xmlns:a16="http://schemas.microsoft.com/office/drawing/2014/main" id="{B4E29579-636F-40E3-82E3-A8E87E25E1DA}"/>
+              </a:ext>
+            </a:extLst>
+          </p:cNvPr>
+          <p:cNvSpPr>
+            <a:spLocks noGrp="1"/>
+          </p:cNvSpPr>
+          <p:nvPr>
+            <p:ph idx="1"/>
+          </p:nvPr>
+        </p:nvSpPr>
+        <p:spPr/>
+        <p:txBody>
+          <a:bodyPr>
+            <a:normAutofit fontScale="92500"/>
+          </a:bodyPr>
+          <a:lstStyle/>
+          <a:p>
+            <a:r>
+              <a:rPr lang="en-US" dirty="0"/>
+              <a:t>Whitening is a transformation that can improve the performance of some detectors in noisy environments</a:t>
+            </a:r>
+          </a:p>
+          <a:p>
+            <a:r>
+              <a:rPr lang="en-US" dirty="0"/>
+              <a:t>There is no implementation of the Adaptive line enhancer (ALE) filter in R, so this step must be done manually in Raven 1.5</a:t>
+            </a:r>
+          </a:p>
+          <a:p>
+            <a:pPr lvl="1"/>
+            <a:r>
+              <a:rPr lang="en-US" dirty="0"/>
+              <a:t>The script will map to the containing whitened data as long as naming conventions are followed. </a:t>
+            </a:r>
+          </a:p>
+          <a:p>
+            <a:r>
+              <a:rPr lang="en-US" dirty="0"/>
+              <a:t>Least mean squared and filter order parameter most effective to modify.</a:t>
+            </a:r>
+          </a:p>
+          <a:p>
+            <a:r>
+              <a:rPr lang="en-US" dirty="0"/>
+              <a:t>Because any performance gains seem incremental at best in the current version of the detector, as well as the inconvenience of having to implement it manually, whitening is currently not a recommended data transformation. </a:t>
+            </a:r>
+          </a:p>
+        </p:txBody>
+      </p:sp>
+    </p:spTree>
+    <p:extLst>
+      <p:ext uri="{BB962C8B-B14F-4D97-AF65-F5344CB8AC3E}">
+        <p14:creationId xmlns:p14="http://schemas.microsoft.com/office/powerpoint/2010/main" val="1642259018"/>
+      </p:ext>
+    </p:extLst>
+  </p:cSld>
+  <p:clrMapOvr>
+    <a:masterClrMapping/>
+  </p:clrMapOvr>
+</p:sld>
+</file>
+
+<file path=ppt/slides/slide6.xml><?xml version="1.0" encoding="utf-8"?>
+<p:sld xmlns:a="http://schemas.openxmlformats.org/drawingml/2006/main" xmlns:r="http://schemas.openxmlformats.org/officeDocument/2006/relationships" xmlns:p="http://schemas.openxmlformats.org/presentationml/2006/main">
+  <p:cSld>
+    <p:spTree>
+      <p:nvGrpSpPr>
+        <p:cNvPr id="1" name=""/>
+        <p:cNvGrpSpPr/>
+        <p:nvPr/>
+      </p:nvGrpSpPr>
+      <p:grpSpPr>
+        <a:xfrm>
+          <a:off x="0" y="0"/>
+          <a:ext cx="0" cy="0"/>
+          <a:chOff x="0" y="0"/>
+          <a:chExt cx="0" cy="0"/>
+        </a:xfrm>
+      </p:grpSpPr>
+      <p:sp>
+        <p:nvSpPr>
+          <p:cNvPr id="2" name="Title 1">
+            <a:extLst>
+              <a:ext uri="{FF2B5EF4-FFF2-40B4-BE49-F238E27FC236}">
+                <a16:creationId xmlns:a16="http://schemas.microsoft.com/office/drawing/2014/main" id="{62053B05-A8E2-4D8B-827E-CC71499D7F5B}"/>
+              </a:ext>
+            </a:extLst>
+          </p:cNvPr>
+          <p:cNvSpPr>
+            <a:spLocks noGrp="1"/>
+          </p:cNvSpPr>
+          <p:nvPr>
+            <p:ph type="title"/>
+          </p:nvPr>
+        </p:nvSpPr>
+        <p:spPr/>
+        <p:txBody>
+          <a:bodyPr/>
+          <a:lstStyle/>
+          <a:p>
+            <a:r>
+              <a:rPr lang="en-US" dirty="0"/>
+              <a:t>Data processing: Combination</a:t>
+            </a:r>
+          </a:p>
+        </p:txBody>
+      </p:sp>
+      <p:sp>
+        <p:nvSpPr>
+          <p:cNvPr id="3" name="Content Placeholder 2">
+            <a:extLst>
+              <a:ext uri="{FF2B5EF4-FFF2-40B4-BE49-F238E27FC236}">
+                <a16:creationId xmlns:a16="http://schemas.microsoft.com/office/drawing/2014/main" id="{33B917BE-655C-48F7-B84A-7508F49E29BA}"/>
+              </a:ext>
+            </a:extLst>
+          </p:cNvPr>
+          <p:cNvSpPr>
+            <a:spLocks noGrp="1"/>
+          </p:cNvSpPr>
+          <p:nvPr>
+            <p:ph idx="1"/>
+          </p:nvPr>
+        </p:nvSpPr>
+        <p:spPr/>
+        <p:txBody>
+          <a:bodyPr/>
+          <a:lstStyle/>
+          <a:p>
+            <a:r>
+              <a:rPr lang="en-US" dirty="0"/>
+              <a:t>In order to reduce the overhead of accessing Raven Pro 1.5 through API, sound files are combined to bundle up the call to the Raven band limited energy detectors (BLEDs).</a:t>
+            </a:r>
+          </a:p>
+          <a:p>
+            <a:r>
+              <a:rPr lang="en-US" dirty="0"/>
+              <a:t>Combination happens automatically, but takes up some extra disk space</a:t>
+            </a:r>
+          </a:p>
+          <a:p>
+            <a:r>
+              <a:rPr lang="en-US" dirty="0"/>
+              <a:t>Large files may be broken up into chunks according to user specification.</a:t>
+            </a:r>
+          </a:p>
+          <a:p>
+            <a:r>
+              <a:rPr lang="en-US" dirty="0"/>
+              <a:t>These combined sound files are also useful for ease of access when loading up data for manual review of data.   </a:t>
+            </a:r>
+          </a:p>
+        </p:txBody>
+      </p:sp>
+    </p:spTree>
+    <p:extLst>
+      <p:ext uri="{BB962C8B-B14F-4D97-AF65-F5344CB8AC3E}">
+        <p14:creationId xmlns:p14="http://schemas.microsoft.com/office/powerpoint/2010/main" val="2538397276"/>
+      </p:ext>
+    </p:extLst>
+  </p:cSld>
+  <p:clrMapOvr>
+    <a:masterClrMapping/>
+  </p:clrMapOvr>
+</p:sld>
+</file>
+
+<file path=ppt/slides/slide7.xml><?xml version="1.0" encoding="utf-8"?>
+<p:sld xmlns:a="http://schemas.openxmlformats.org/drawingml/2006/main" xmlns:r="http://schemas.openxmlformats.org/officeDocument/2006/relationships" xmlns:p="http://schemas.openxmlformats.org/presentationml/2006/main">
+  <p:cSld>
+    <p:spTree>
+      <p:nvGrpSpPr>
+        <p:cNvPr id="1" name=""/>
+        <p:cNvGrpSpPr/>
+        <p:nvPr/>
+      </p:nvGrpSpPr>
+      <p:grpSpPr>
+        <a:xfrm>
+          <a:off x="0" y="0"/>
+          <a:ext cx="0" cy="0"/>
+          <a:chOff x="0" y="0"/>
+          <a:chExt cx="0" cy="0"/>
+        </a:xfrm>
+      </p:grpSpPr>
+      <p:sp>
+        <p:nvSpPr>
+          <p:cNvPr id="2" name="Title 1">
+            <a:extLst>
+              <a:ext uri="{FF2B5EF4-FFF2-40B4-BE49-F238E27FC236}">
+                <a16:creationId xmlns:a16="http://schemas.microsoft.com/office/drawing/2014/main" id="{BEA1A527-E9F8-44E2-B27D-638C3E5D8BAD}"/>
+              </a:ext>
+            </a:extLst>
+          </p:cNvPr>
+          <p:cNvSpPr>
+            <a:spLocks noGrp="1"/>
+          </p:cNvSpPr>
+          <p:nvPr>
+            <p:ph type="title"/>
+          </p:nvPr>
+        </p:nvSpPr>
+        <p:spPr/>
+        <p:txBody>
+          <a:bodyPr/>
+          <a:lstStyle/>
+          <a:p>
+            <a:r>
+              <a:rPr lang="en-US" dirty="0"/>
+              <a:t>Detector: Raven BLEDs</a:t>
+            </a:r>
+          </a:p>
+        </p:txBody>
+      </p:sp>
+      <p:sp>
+        <p:nvSpPr>
+          <p:cNvPr id="3" name="Content Placeholder 2">
+            <a:extLst>
+              <a:ext uri="{FF2B5EF4-FFF2-40B4-BE49-F238E27FC236}">
+                <a16:creationId xmlns:a16="http://schemas.microsoft.com/office/drawing/2014/main" id="{C82603C7-7F0A-43D7-ADE6-C5C3CDBD9C7C}"/>
+              </a:ext>
+            </a:extLst>
+          </p:cNvPr>
+          <p:cNvSpPr>
+            <a:spLocks noGrp="1"/>
+          </p:cNvSpPr>
+          <p:nvPr>
+            <p:ph idx="1"/>
+          </p:nvPr>
+        </p:nvSpPr>
+        <p:spPr/>
+        <p:txBody>
+          <a:bodyPr/>
+          <a:lstStyle/>
+          <a:p>
+            <a:r>
+              <a:rPr lang="en-US" dirty="0"/>
+              <a:t>Found that more narrowband BLED resulted in higher chance for detection of SOI, and can be used as a pitch tracker to provide an initial filter for detections</a:t>
+            </a:r>
+          </a:p>
+          <a:p>
+            <a:r>
+              <a:rPr lang="en-US" dirty="0"/>
+              <a:t>Each species has a suite of Raven BLEDs that each correspond to a portion of the desired frequency range. These are created by the user in Raven, but called through the script. </a:t>
+            </a:r>
+          </a:p>
+        </p:txBody>
+      </p:sp>
+    </p:spTree>
+    <p:extLst>
+      <p:ext uri="{BB962C8B-B14F-4D97-AF65-F5344CB8AC3E}">
+        <p14:creationId xmlns:p14="http://schemas.microsoft.com/office/powerpoint/2010/main" val="3522285960"/>
       </p:ext>
     </p:extLst>
   </p:cSld>

</xml_diff>